<commit_message>
added fp to slides
</commit_message>
<xml_diff>
--- a/Pres/SP-FirstPresentation.pptx
+++ b/Pres/SP-FirstPresentation.pptx
@@ -6,7 +6,7 @@
     <p:sldMasterId id="2147483649" r:id="rId2"/>
   </p:sldMasterIdLst>
   <p:notesMasterIdLst>
-    <p:notesMasterId r:id="rId19"/>
+    <p:notesMasterId r:id="rId20"/>
   </p:notesMasterIdLst>
   <p:sldIdLst>
     <p:sldId id="256" r:id="rId3"/>
@@ -25,6 +25,7 @@
     <p:sldId id="269" r:id="rId16"/>
     <p:sldId id="265" r:id="rId17"/>
     <p:sldId id="266" r:id="rId18"/>
+    <p:sldId id="273" r:id="rId19"/>
   </p:sldIdLst>
   <p:sldSz cx="9144000" cy="6858000" type="screen4x3"/>
   <p:notesSz cx="6792913" cy="9932988"/>
@@ -180,7 +181,7 @@
   </p:defaultTextStyle>
   <p:extLst>
     <p:ext uri="{EFAFB233-063F-42B5-8137-9DF3F51BA10A}">
-      <p15:sldGuideLst xmlns:p15="http://schemas.microsoft.com/office/powerpoint/2012/main" xmlns="">
+      <p15:sldGuideLst xmlns:p15="http://schemas.microsoft.com/office/powerpoint/2012/main">
         <p15:guide id="1" orient="horz" pos="2160">
           <p15:clr>
             <a:srgbClr val="A4A3A4"/>
@@ -194,7 +195,7 @@
       </p15:sldGuideLst>
     </p:ext>
     <p:ext uri="{2D200454-40CA-4A62-9FC3-DE9A4176ACB9}">
-      <p15:notesGuideLst xmlns:p15="http://schemas.microsoft.com/office/powerpoint/2012/main" xmlns="">
+      <p15:notesGuideLst xmlns:p15="http://schemas.microsoft.com/office/powerpoint/2012/main">
         <p15:guide id="1" orient="horz" pos="2880">
           <p15:clr>
             <a:srgbClr val="A4A3A4"/>
@@ -263,7 +264,7 @@
           <a:effectLst/>
           <a:extLst>
             <a:ext uri="{91240B29-F687-4f45-9708-019B960494DF}">
-              <a14:hiddenLine xmlns:a14="http://schemas.microsoft.com/office/drawing/2010/main" w="9360" cap="sq">
+              <a14:hiddenLine xmlns:a14="http://schemas.microsoft.com/office/drawing/2010/main" xmlns="" w="9360" cap="sq">
                 <a:solidFill>
                   <a:srgbClr val="000000"/>
                 </a:solidFill>
@@ -273,7 +274,7 @@
               </a14:hiddenLine>
             </a:ext>
             <a:ext uri="{AF507438-7753-43e0-B8FC-AC1667EBCBE1}">
-              <a14:hiddenEffects xmlns:a14="http://schemas.microsoft.com/office/drawing/2010/main">
+              <a14:hiddenEffects xmlns:a14="http://schemas.microsoft.com/office/drawing/2010/main" xmlns="">
                 <a:effectLst>
                   <a:outerShdw blurRad="63500" dist="38099" dir="2700000" algn="ctr" rotWithShape="0">
                     <a:srgbClr val="000000">
@@ -320,7 +321,7 @@
           <a:effectLst/>
           <a:extLst>
             <a:ext uri="{91240B29-F687-4f45-9708-019B960494DF}">
-              <a14:hiddenLine xmlns:a14="http://schemas.microsoft.com/office/drawing/2010/main" w="9525" cap="flat">
+              <a14:hiddenLine xmlns:a14="http://schemas.microsoft.com/office/drawing/2010/main" xmlns="" w="9525" cap="flat">
                 <a:solidFill>
                   <a:srgbClr val="3465A4"/>
                 </a:solidFill>
@@ -330,7 +331,7 @@
               </a14:hiddenLine>
             </a:ext>
             <a:ext uri="{AF507438-7753-43e0-B8FC-AC1667EBCBE1}">
-              <a14:hiddenEffects xmlns:a14="http://schemas.microsoft.com/office/drawing/2010/main">
+              <a14:hiddenEffects xmlns:a14="http://schemas.microsoft.com/office/drawing/2010/main" xmlns="">
                 <a:effectLst>
                   <a:outerShdw blurRad="63500" dist="38099" dir="2700000" algn="ctr" rotWithShape="0">
                     <a:srgbClr val="000000">
@@ -377,7 +378,7 @@
           <a:effectLst/>
           <a:extLst>
             <a:ext uri="{91240B29-F687-4f45-9708-019B960494DF}">
-              <a14:hiddenLine xmlns:a14="http://schemas.microsoft.com/office/drawing/2010/main" w="9525" cap="flat">
+              <a14:hiddenLine xmlns:a14="http://schemas.microsoft.com/office/drawing/2010/main" xmlns="" w="9525" cap="flat">
                 <a:solidFill>
                   <a:srgbClr val="3465A4"/>
                 </a:solidFill>
@@ -387,7 +388,7 @@
               </a14:hiddenLine>
             </a:ext>
             <a:ext uri="{AF507438-7753-43e0-B8FC-AC1667EBCBE1}">
-              <a14:hiddenEffects xmlns:a14="http://schemas.microsoft.com/office/drawing/2010/main">
+              <a14:hiddenEffects xmlns:a14="http://schemas.microsoft.com/office/drawing/2010/main" xmlns="">
                 <a:effectLst>
                   <a:outerShdw blurRad="63500" dist="38099" dir="2700000" algn="ctr" rotWithShape="0">
                     <a:srgbClr val="000000">
@@ -430,14 +431,14 @@
           <a:effectLst/>
           <a:extLst>
             <a:ext uri="{909E8E84-426E-40dd-AFC4-6F175D3DCCD1}">
-              <a14:hiddenFill xmlns:a14="http://schemas.microsoft.com/office/drawing/2010/main">
+              <a14:hiddenFill xmlns:a14="http://schemas.microsoft.com/office/drawing/2010/main" xmlns="">
                 <a:solidFill>
                   <a:srgbClr val="FFFFFF"/>
                 </a:solidFill>
               </a14:hiddenFill>
             </a:ext>
             <a:ext uri="{91240B29-F687-4f45-9708-019B960494DF}">
-              <a14:hiddenLine xmlns:a14="http://schemas.microsoft.com/office/drawing/2010/main" w="9525" cap="flat">
+              <a14:hiddenLine xmlns:a14="http://schemas.microsoft.com/office/drawing/2010/main" xmlns="" w="9525" cap="flat">
                 <a:solidFill>
                   <a:srgbClr val="3465A4"/>
                 </a:solidFill>
@@ -447,7 +448,7 @@
               </a14:hiddenLine>
             </a:ext>
             <a:ext uri="{AF507438-7753-43e0-B8FC-AC1667EBCBE1}">
-              <a14:hiddenEffects xmlns:a14="http://schemas.microsoft.com/office/drawing/2010/main">
+              <a14:hiddenEffects xmlns:a14="http://schemas.microsoft.com/office/drawing/2010/main" xmlns="">
                 <a:effectLst>
                   <a:outerShdw blurRad="63500" dist="38099" dir="2700000" algn="ctr" rotWithShape="0">
                     <a:srgbClr val="000000">
@@ -490,14 +491,14 @@
           <a:effectLst/>
           <a:extLst>
             <a:ext uri="{909E8E84-426E-40dd-AFC4-6F175D3DCCD1}">
-              <a14:hiddenFill xmlns:a14="http://schemas.microsoft.com/office/drawing/2010/main">
+              <a14:hiddenFill xmlns:a14="http://schemas.microsoft.com/office/drawing/2010/main" xmlns="">
                 <a:solidFill>
                   <a:srgbClr val="FFFFFF"/>
                 </a:solidFill>
               </a14:hiddenFill>
             </a:ext>
             <a:ext uri="{91240B29-F687-4f45-9708-019B960494DF}">
-              <a14:hiddenLine xmlns:a14="http://schemas.microsoft.com/office/drawing/2010/main" w="9525" cap="flat">
+              <a14:hiddenLine xmlns:a14="http://schemas.microsoft.com/office/drawing/2010/main" xmlns="" w="9525" cap="flat">
                 <a:solidFill>
                   <a:srgbClr val="3465A4"/>
                 </a:solidFill>
@@ -507,7 +508,7 @@
               </a14:hiddenLine>
             </a:ext>
             <a:ext uri="{AF507438-7753-43e0-B8FC-AC1667EBCBE1}">
-              <a14:hiddenEffects xmlns:a14="http://schemas.microsoft.com/office/drawing/2010/main">
+              <a14:hiddenEffects xmlns:a14="http://schemas.microsoft.com/office/drawing/2010/main" xmlns="">
                 <a:effectLst>
                   <a:outerShdw blurRad="63500" dist="38099" dir="2700000" algn="ctr" rotWithShape="0">
                     <a:srgbClr val="000000">
@@ -552,14 +553,14 @@
           <a:effectLst/>
           <a:extLst>
             <a:ext uri="{909E8E84-426E-40dd-AFC4-6F175D3DCCD1}">
-              <a14:hiddenFill xmlns:a14="http://schemas.microsoft.com/office/drawing/2010/main">
+              <a14:hiddenFill xmlns:a14="http://schemas.microsoft.com/office/drawing/2010/main" xmlns="">
                 <a:solidFill>
                   <a:srgbClr val="FFFFFF"/>
                 </a:solidFill>
               </a14:hiddenFill>
             </a:ext>
             <a:ext uri="{91240B29-F687-4f45-9708-019B960494DF}">
-              <a14:hiddenLine xmlns:a14="http://schemas.microsoft.com/office/drawing/2010/main" w="9525" cap="flat">
+              <a14:hiddenLine xmlns:a14="http://schemas.microsoft.com/office/drawing/2010/main" xmlns="" w="9525" cap="flat">
                 <a:solidFill>
                   <a:srgbClr val="3465A4"/>
                 </a:solidFill>
@@ -569,7 +570,7 @@
               </a14:hiddenLine>
             </a:ext>
             <a:ext uri="{AF507438-7753-43e0-B8FC-AC1667EBCBE1}">
-              <a14:hiddenEffects xmlns:a14="http://schemas.microsoft.com/office/drawing/2010/main">
+              <a14:hiddenEffects xmlns:a14="http://schemas.microsoft.com/office/drawing/2010/main" xmlns="">
                 <a:effectLst>
                   <a:outerShdw blurRad="63500" dist="38099" dir="2700000" algn="ctr" rotWithShape="0">
                     <a:schemeClr val="bg2">
@@ -580,7 +581,7 @@
               </a14:hiddenEffects>
             </a:ext>
             <a:ext uri="{FAA26D3D-D897-4be2-8F04-BA451C77F1D7}">
-              <ma14:placeholderFlag xmlns:ma14="http://schemas.microsoft.com/office/mac/drawingml/2011/main" val="1"/>
+              <ma14:placeholderFlag xmlns:ma14="http://schemas.microsoft.com/office/mac/drawingml/2011/main" xmlns="" val="1"/>
             </a:ext>
           </a:extLst>
         </p:spPr>
@@ -610,14 +611,14 @@
           <a:effectLst/>
           <a:extLst>
             <a:ext uri="{909E8E84-426E-40dd-AFC4-6F175D3DCCD1}">
-              <a14:hiddenFill xmlns:a14="http://schemas.microsoft.com/office/drawing/2010/main">
+              <a14:hiddenFill xmlns:a14="http://schemas.microsoft.com/office/drawing/2010/main" xmlns="">
                 <a:solidFill>
                   <a:srgbClr val="FFFFFF"/>
                 </a:solidFill>
               </a14:hiddenFill>
             </a:ext>
             <a:ext uri="{91240B29-F687-4f45-9708-019B960494DF}">
-              <a14:hiddenLine xmlns:a14="http://schemas.microsoft.com/office/drawing/2010/main" w="9525" cap="flat">
+              <a14:hiddenLine xmlns:a14="http://schemas.microsoft.com/office/drawing/2010/main" xmlns="" w="9525" cap="flat">
                 <a:solidFill>
                   <a:srgbClr val="3465A4"/>
                 </a:solidFill>
@@ -627,7 +628,7 @@
               </a14:hiddenLine>
             </a:ext>
             <a:ext uri="{AF507438-7753-43e0-B8FC-AC1667EBCBE1}">
-              <a14:hiddenEffects xmlns:a14="http://schemas.microsoft.com/office/drawing/2010/main">
+              <a14:hiddenEffects xmlns:a14="http://schemas.microsoft.com/office/drawing/2010/main" xmlns="">
                 <a:effectLst>
                   <a:outerShdw blurRad="63500" dist="38099" dir="2700000" algn="ctr" rotWithShape="0">
                     <a:schemeClr val="bg2">
@@ -638,7 +639,7 @@
               </a14:hiddenEffects>
             </a:ext>
             <a:ext uri="{FAA26D3D-D897-4be2-8F04-BA451C77F1D7}">
-              <ma14:placeholderFlag xmlns:ma14="http://schemas.microsoft.com/office/mac/drawingml/2011/main" val="1"/>
+              <ma14:placeholderFlag xmlns:ma14="http://schemas.microsoft.com/office/mac/drawingml/2011/main" xmlns="" val="1"/>
             </a:ext>
           </a:extLst>
         </p:spPr>
@@ -678,14 +679,14 @@
           <a:effectLst/>
           <a:extLst>
             <a:ext uri="{909E8E84-426E-40dd-AFC4-6F175D3DCCD1}">
-              <a14:hiddenFill xmlns:a14="http://schemas.microsoft.com/office/drawing/2010/main">
+              <a14:hiddenFill xmlns:a14="http://schemas.microsoft.com/office/drawing/2010/main" xmlns="">
                 <a:solidFill>
                   <a:srgbClr val="FFFFFF"/>
                 </a:solidFill>
               </a14:hiddenFill>
             </a:ext>
             <a:ext uri="{91240B29-F687-4f45-9708-019B960494DF}">
-              <a14:hiddenLine xmlns:a14="http://schemas.microsoft.com/office/drawing/2010/main" w="9525" cap="flat">
+              <a14:hiddenLine xmlns:a14="http://schemas.microsoft.com/office/drawing/2010/main" xmlns="" w="9525" cap="flat">
                 <a:solidFill>
                   <a:srgbClr val="3465A4"/>
                 </a:solidFill>
@@ -695,7 +696,7 @@
               </a14:hiddenLine>
             </a:ext>
             <a:ext uri="{AF507438-7753-43e0-B8FC-AC1667EBCBE1}">
-              <a14:hiddenEffects xmlns:a14="http://schemas.microsoft.com/office/drawing/2010/main">
+              <a14:hiddenEffects xmlns:a14="http://schemas.microsoft.com/office/drawing/2010/main" xmlns="">
                 <a:effectLst>
                   <a:outerShdw blurRad="63500" dist="38099" dir="2700000" algn="ctr" rotWithShape="0">
                     <a:srgbClr val="000000">
@@ -740,14 +741,14 @@
           <a:effectLst/>
           <a:extLst>
             <a:ext uri="{909E8E84-426E-40dd-AFC4-6F175D3DCCD1}">
-              <a14:hiddenFill xmlns:a14="http://schemas.microsoft.com/office/drawing/2010/main">
+              <a14:hiddenFill xmlns:a14="http://schemas.microsoft.com/office/drawing/2010/main" xmlns="">
                 <a:solidFill>
                   <a:srgbClr val="FFFFFF"/>
                 </a:solidFill>
               </a14:hiddenFill>
             </a:ext>
             <a:ext uri="{91240B29-F687-4f45-9708-019B960494DF}">
-              <a14:hiddenLine xmlns:a14="http://schemas.microsoft.com/office/drawing/2010/main" w="9525" cap="flat">
+              <a14:hiddenLine xmlns:a14="http://schemas.microsoft.com/office/drawing/2010/main" xmlns="" w="9525" cap="flat">
                 <a:solidFill>
                   <a:srgbClr val="3465A4"/>
                 </a:solidFill>
@@ -757,7 +758,7 @@
               </a14:hiddenLine>
             </a:ext>
             <a:ext uri="{AF507438-7753-43e0-B8FC-AC1667EBCBE1}">
-              <a14:hiddenEffects xmlns:a14="http://schemas.microsoft.com/office/drawing/2010/main">
+              <a14:hiddenEffects xmlns:a14="http://schemas.microsoft.com/office/drawing/2010/main" xmlns="">
                 <a:effectLst>
                   <a:outerShdw blurRad="63500" dist="38099" dir="2700000" algn="ctr" rotWithShape="0">
                     <a:schemeClr val="bg2">
@@ -768,7 +769,7 @@
               </a14:hiddenEffects>
             </a:ext>
             <a:ext uri="{FAA26D3D-D897-4be2-8F04-BA451C77F1D7}">
-              <ma14:placeholderFlag xmlns:ma14="http://schemas.microsoft.com/office/mac/drawingml/2011/main" val="1"/>
+              <ma14:placeholderFlag xmlns:ma14="http://schemas.microsoft.com/office/mac/drawingml/2011/main" xmlns="" val="1"/>
             </a:ext>
           </a:extLst>
         </p:spPr>
@@ -1042,14 +1043,14 @@
           <a:effectLst/>
           <a:extLst>
             <a:ext uri="{909E8E84-426E-40dd-AFC4-6F175D3DCCD1}">
-              <a14:hiddenFill xmlns:a14="http://schemas.microsoft.com/office/drawing/2010/main">
+              <a14:hiddenFill xmlns:a14="http://schemas.microsoft.com/office/drawing/2010/main" xmlns="">
                 <a:solidFill>
                   <a:srgbClr val="FFFFFF"/>
                 </a:solidFill>
               </a14:hiddenFill>
             </a:ext>
             <a:ext uri="{91240B29-F687-4f45-9708-019B960494DF}">
-              <a14:hiddenLine xmlns:a14="http://schemas.microsoft.com/office/drawing/2010/main" w="9525" cap="flat">
+              <a14:hiddenLine xmlns:a14="http://schemas.microsoft.com/office/drawing/2010/main" xmlns="" w="9525" cap="flat">
                 <a:solidFill>
                   <a:srgbClr val="3465A4"/>
                 </a:solidFill>
@@ -1059,7 +1060,7 @@
               </a14:hiddenLine>
             </a:ext>
             <a:ext uri="{AF507438-7753-43e0-B8FC-AC1667EBCBE1}">
-              <a14:hiddenEffects xmlns:a14="http://schemas.microsoft.com/office/drawing/2010/main">
+              <a14:hiddenEffects xmlns:a14="http://schemas.microsoft.com/office/drawing/2010/main" xmlns="">
                 <a:effectLst>
                   <a:outerShdw blurRad="63500" dist="38099" dir="2700000" algn="ctr" rotWithShape="0">
                     <a:srgbClr val="000000">
@@ -1110,7 +1111,7 @@
           </a:ln>
           <a:extLst>
             <a:ext uri="{AF507438-7753-43e0-B8FC-AC1667EBCBE1}">
-              <a14:hiddenEffects xmlns:a14="http://schemas.microsoft.com/office/drawing/2010/main">
+              <a14:hiddenEffects xmlns:a14="http://schemas.microsoft.com/office/drawing/2010/main" xmlns="">
                 <a:effectLst>
                   <a:outerShdw blurRad="63500" dist="38099" dir="2700000" algn="ctr" rotWithShape="0">
                     <a:srgbClr val="000000">
@@ -1146,14 +1147,14 @@
           <a:effectLst/>
           <a:extLst>
             <a:ext uri="{909E8E84-426E-40dd-AFC4-6F175D3DCCD1}">
-              <a14:hiddenFill xmlns:a14="http://schemas.microsoft.com/office/drawing/2010/main">
+              <a14:hiddenFill xmlns:a14="http://schemas.microsoft.com/office/drawing/2010/main" xmlns="">
                 <a:solidFill>
                   <a:srgbClr val="FFFFFF"/>
                 </a:solidFill>
               </a14:hiddenFill>
             </a:ext>
             <a:ext uri="{91240B29-F687-4f45-9708-019B960494DF}">
-              <a14:hiddenLine xmlns:a14="http://schemas.microsoft.com/office/drawing/2010/main" w="9525" cap="flat">
+              <a14:hiddenLine xmlns:a14="http://schemas.microsoft.com/office/drawing/2010/main" xmlns="" w="9525" cap="flat">
                 <a:solidFill>
                   <a:srgbClr val="3465A4"/>
                 </a:solidFill>
@@ -1163,7 +1164,7 @@
               </a14:hiddenLine>
             </a:ext>
             <a:ext uri="{AF507438-7753-43e0-B8FC-AC1667EBCBE1}">
-              <a14:hiddenEffects xmlns:a14="http://schemas.microsoft.com/office/drawing/2010/main">
+              <a14:hiddenEffects xmlns:a14="http://schemas.microsoft.com/office/drawing/2010/main" xmlns="">
                 <a:effectLst>
                   <a:outerShdw blurRad="63500" dist="38099" dir="2700000" algn="ctr" rotWithShape="0">
                     <a:srgbClr val="000000">
@@ -1297,7 +1298,7 @@
           </a:ln>
           <a:extLst>
             <a:ext uri="{AF507438-7753-43e0-B8FC-AC1667EBCBE1}">
-              <a14:hiddenEffects xmlns:a14="http://schemas.microsoft.com/office/drawing/2010/main">
+              <a14:hiddenEffects xmlns:a14="http://schemas.microsoft.com/office/drawing/2010/main" xmlns="">
                 <a:effectLst>
                   <a:outerShdw blurRad="63500" dist="38099" dir="2700000" algn="ctr" rotWithShape="0">
                     <a:srgbClr val="000000">
@@ -1333,14 +1334,14 @@
           <a:effectLst/>
           <a:extLst>
             <a:ext uri="{909E8E84-426E-40dd-AFC4-6F175D3DCCD1}">
-              <a14:hiddenFill xmlns:a14="http://schemas.microsoft.com/office/drawing/2010/main">
+              <a14:hiddenFill xmlns:a14="http://schemas.microsoft.com/office/drawing/2010/main" xmlns="">
                 <a:solidFill>
                   <a:srgbClr val="FFFFFF"/>
                 </a:solidFill>
               </a14:hiddenFill>
             </a:ext>
             <a:ext uri="{91240B29-F687-4f45-9708-019B960494DF}">
-              <a14:hiddenLine xmlns:a14="http://schemas.microsoft.com/office/drawing/2010/main" w="9525" cap="flat">
+              <a14:hiddenLine xmlns:a14="http://schemas.microsoft.com/office/drawing/2010/main" xmlns="" w="9525" cap="flat">
                 <a:solidFill>
                   <a:srgbClr val="3465A4"/>
                 </a:solidFill>
@@ -1350,7 +1351,7 @@
               </a14:hiddenLine>
             </a:ext>
             <a:ext uri="{AF507438-7753-43e0-B8FC-AC1667EBCBE1}">
-              <a14:hiddenEffects xmlns:a14="http://schemas.microsoft.com/office/drawing/2010/main">
+              <a14:hiddenEffects xmlns:a14="http://schemas.microsoft.com/office/drawing/2010/main" xmlns="">
                 <a:effectLst>
                   <a:outerShdw blurRad="63500" dist="38099" dir="2700000" algn="ctr" rotWithShape="0">
                     <a:srgbClr val="000000">
@@ -1393,14 +1394,14 @@
           <a:effectLst/>
           <a:extLst>
             <a:ext uri="{909E8E84-426E-40dd-AFC4-6F175D3DCCD1}">
-              <a14:hiddenFill xmlns:a14="http://schemas.microsoft.com/office/drawing/2010/main">
+              <a14:hiddenFill xmlns:a14="http://schemas.microsoft.com/office/drawing/2010/main" xmlns="">
                 <a:solidFill>
                   <a:srgbClr val="FFFFFF"/>
                 </a:solidFill>
               </a14:hiddenFill>
             </a:ext>
             <a:ext uri="{91240B29-F687-4f45-9708-019B960494DF}">
-              <a14:hiddenLine xmlns:a14="http://schemas.microsoft.com/office/drawing/2010/main" w="9525" cap="flat">
+              <a14:hiddenLine xmlns:a14="http://schemas.microsoft.com/office/drawing/2010/main" xmlns="" w="9525" cap="flat">
                 <a:solidFill>
                   <a:srgbClr val="000000"/>
                 </a:solidFill>
@@ -1410,7 +1411,7 @@
               </a14:hiddenLine>
             </a:ext>
             <a:ext uri="{AF507438-7753-43e0-B8FC-AC1667EBCBE1}">
-              <a14:hiddenEffects xmlns:a14="http://schemas.microsoft.com/office/drawing/2010/main">
+              <a14:hiddenEffects xmlns:a14="http://schemas.microsoft.com/office/drawing/2010/main" xmlns="">
                 <a:effectLst>
                   <a:outerShdw blurRad="63500" dist="38099" dir="2700000" algn="ctr" rotWithShape="0">
                     <a:srgbClr val="000000">
@@ -2690,7 +2691,7 @@
             <a:fld id="{F5DD8764-190F-504E-957F-C8447ED72940}" type="datetime1">
               <a:rPr lang="nl-NL"/>
               <a:pPr/>
-              <a:t>01/12/15</a:t>
+              <a:t>1-12-2015</a:t>
             </a:fld>
             <a:endParaRPr lang="nl-NL"/>
           </a:p>
@@ -2855,7 +2856,7 @@
             <a:fld id="{F5DD8764-190F-504E-957F-C8447ED72940}" type="datetime1">
               <a:rPr lang="nl-NL"/>
               <a:pPr/>
-              <a:t>01/12/15</a:t>
+              <a:t>1-12-2015</a:t>
             </a:fld>
             <a:endParaRPr lang="nl-NL"/>
           </a:p>
@@ -3030,7 +3031,7 @@
             <a:fld id="{F5DD8764-190F-504E-957F-C8447ED72940}" type="datetime1">
               <a:rPr lang="nl-NL"/>
               <a:pPr/>
-              <a:t>01/12/15</a:t>
+              <a:t>1-12-2015</a:t>
             </a:fld>
             <a:endParaRPr lang="nl-NL"/>
           </a:p>
@@ -3153,7 +3154,7 @@
             <a:fld id="{F5DD8764-190F-504E-957F-C8447ED72940}" type="datetime1">
               <a:rPr lang="nl-NL"/>
               <a:pPr/>
-              <a:t>01/12/15</a:t>
+              <a:t>1-12-2015</a:t>
             </a:fld>
             <a:endParaRPr lang="nl-NL"/>
           </a:p>
@@ -3341,7 +3342,7 @@
             <a:fld id="{70DC9591-908D-E442-BCA0-75E7C4843B27}" type="datetime1">
               <a:rPr lang="en-US"/>
               <a:pPr/>
-              <a:t>01/12/15</a:t>
+              <a:t>12/1/2015</a:t>
             </a:fld>
             <a:endParaRPr lang="en-US"/>
           </a:p>
@@ -3506,7 +3507,7 @@
             <a:fld id="{70DC9591-908D-E442-BCA0-75E7C4843B27}" type="datetime1">
               <a:rPr lang="en-US"/>
               <a:pPr/>
-              <a:t>01/12/15</a:t>
+              <a:t>12/1/2015</a:t>
             </a:fld>
             <a:endParaRPr lang="en-US"/>
           </a:p>
@@ -3693,7 +3694,7 @@
             <a:fld id="{70DC9591-908D-E442-BCA0-75E7C4843B27}" type="datetime1">
               <a:rPr lang="en-US"/>
               <a:pPr/>
-              <a:t>01/12/15</a:t>
+              <a:t>12/1/2015</a:t>
             </a:fld>
             <a:endParaRPr lang="en-US"/>
           </a:p>
@@ -3976,7 +3977,7 @@
             <a:fld id="{70DC9591-908D-E442-BCA0-75E7C4843B27}" type="datetime1">
               <a:rPr lang="en-US"/>
               <a:pPr/>
-              <a:t>01/12/15</a:t>
+              <a:t>12/1/2015</a:t>
             </a:fld>
             <a:endParaRPr lang="en-US"/>
           </a:p>
@@ -4398,7 +4399,7 @@
             <a:fld id="{70DC9591-908D-E442-BCA0-75E7C4843B27}" type="datetime1">
               <a:rPr lang="en-US"/>
               <a:pPr/>
-              <a:t>01/12/15</a:t>
+              <a:t>12/1/2015</a:t>
             </a:fld>
             <a:endParaRPr lang="en-US"/>
           </a:p>
@@ -4511,7 +4512,7 @@
             <a:fld id="{70DC9591-908D-E442-BCA0-75E7C4843B27}" type="datetime1">
               <a:rPr lang="en-US"/>
               <a:pPr/>
-              <a:t>01/12/15</a:t>
+              <a:t>12/1/2015</a:t>
             </a:fld>
             <a:endParaRPr lang="en-US"/>
           </a:p>
@@ -4601,7 +4602,7 @@
             <a:fld id="{70DC9591-908D-E442-BCA0-75E7C4843B27}" type="datetime1">
               <a:rPr lang="en-US"/>
               <a:pPr/>
-              <a:t>01/12/15</a:t>
+              <a:t>12/1/2015</a:t>
             </a:fld>
             <a:endParaRPr lang="en-US"/>
           </a:p>
@@ -4766,7 +4767,7 @@
             <a:fld id="{F5DD8764-190F-504E-957F-C8447ED72940}" type="datetime1">
               <a:rPr lang="nl-NL"/>
               <a:pPr/>
-              <a:t>01/12/15</a:t>
+              <a:t>1-12-2015</a:t>
             </a:fld>
             <a:endParaRPr lang="nl-NL"/>
           </a:p>
@@ -5038,7 +5039,7 @@
             <a:fld id="{70DC9591-908D-E442-BCA0-75E7C4843B27}" type="datetime1">
               <a:rPr lang="en-US"/>
               <a:pPr/>
-              <a:t>01/12/15</a:t>
+              <a:t>12/1/2015</a:t>
             </a:fld>
             <a:endParaRPr lang="en-US"/>
           </a:p>
@@ -5286,7 +5287,7 @@
             <a:fld id="{70DC9591-908D-E442-BCA0-75E7C4843B27}" type="datetime1">
               <a:rPr lang="en-US"/>
               <a:pPr/>
-              <a:t>01/12/15</a:t>
+              <a:t>12/1/2015</a:t>
             </a:fld>
             <a:endParaRPr lang="en-US"/>
           </a:p>
@@ -5451,7 +5452,7 @@
             <a:fld id="{70DC9591-908D-E442-BCA0-75E7C4843B27}" type="datetime1">
               <a:rPr lang="en-US"/>
               <a:pPr/>
-              <a:t>01/12/15</a:t>
+              <a:t>12/1/2015</a:t>
             </a:fld>
             <a:endParaRPr lang="en-US"/>
           </a:p>
@@ -5626,7 +5627,7 @@
             <a:fld id="{70DC9591-908D-E442-BCA0-75E7C4843B27}" type="datetime1">
               <a:rPr lang="en-US"/>
               <a:pPr/>
-              <a:t>01/12/15</a:t>
+              <a:t>12/1/2015</a:t>
             </a:fld>
             <a:endParaRPr lang="en-US"/>
           </a:p>
@@ -5749,7 +5750,7 @@
             <a:fld id="{70DC9591-908D-E442-BCA0-75E7C4843B27}" type="datetime1">
               <a:rPr lang="en-US"/>
               <a:pPr/>
-              <a:t>01/12/15</a:t>
+              <a:t>12/1/2015</a:t>
             </a:fld>
             <a:endParaRPr lang="en-US"/>
           </a:p>
@@ -5941,7 +5942,7 @@
             <a:fld id="{F5DD8764-190F-504E-957F-C8447ED72940}" type="datetime1">
               <a:rPr lang="nl-NL"/>
               <a:pPr/>
-              <a:t>01/12/15</a:t>
+              <a:t>1-12-2015</a:t>
             </a:fld>
             <a:endParaRPr lang="nl-NL"/>
           </a:p>
@@ -6224,7 +6225,7 @@
             <a:fld id="{F5DD8764-190F-504E-957F-C8447ED72940}" type="datetime1">
               <a:rPr lang="nl-NL"/>
               <a:pPr/>
-              <a:t>01/12/15</a:t>
+              <a:t>1-12-2015</a:t>
             </a:fld>
             <a:endParaRPr lang="nl-NL"/>
           </a:p>
@@ -6646,7 +6647,7 @@
             <a:fld id="{F5DD8764-190F-504E-957F-C8447ED72940}" type="datetime1">
               <a:rPr lang="nl-NL"/>
               <a:pPr/>
-              <a:t>01/12/15</a:t>
+              <a:t>1-12-2015</a:t>
             </a:fld>
             <a:endParaRPr lang="nl-NL"/>
           </a:p>
@@ -6759,7 +6760,7 @@
             <a:fld id="{F5DD8764-190F-504E-957F-C8447ED72940}" type="datetime1">
               <a:rPr lang="nl-NL"/>
               <a:pPr/>
-              <a:t>01/12/15</a:t>
+              <a:t>1-12-2015</a:t>
             </a:fld>
             <a:endParaRPr lang="nl-NL"/>
           </a:p>
@@ -6849,7 +6850,7 @@
             <a:fld id="{F5DD8764-190F-504E-957F-C8447ED72940}" type="datetime1">
               <a:rPr lang="nl-NL"/>
               <a:pPr/>
-              <a:t>01/12/15</a:t>
+              <a:t>1-12-2015</a:t>
             </a:fld>
             <a:endParaRPr lang="nl-NL"/>
           </a:p>
@@ -7121,7 +7122,7 @@
             <a:fld id="{F5DD8764-190F-504E-957F-C8447ED72940}" type="datetime1">
               <a:rPr lang="nl-NL"/>
               <a:pPr/>
-              <a:t>01/12/15</a:t>
+              <a:t>1-12-2015</a:t>
             </a:fld>
             <a:endParaRPr lang="nl-NL"/>
           </a:p>
@@ -7369,7 +7370,7 @@
             <a:fld id="{F5DD8764-190F-504E-957F-C8447ED72940}" type="datetime1">
               <a:rPr lang="nl-NL"/>
               <a:pPr/>
-              <a:t>01/12/15</a:t>
+              <a:t>1-12-2015</a:t>
             </a:fld>
             <a:endParaRPr lang="nl-NL"/>
           </a:p>
@@ -7472,7 +7473,7 @@
           <a:effectLst/>
           <a:extLst>
             <a:ext uri="{91240B29-F687-4f45-9708-019B960494DF}">
-              <a14:hiddenLine xmlns:a14="http://schemas.microsoft.com/office/drawing/2010/main" w="9525" cap="flat">
+              <a14:hiddenLine xmlns:a14="http://schemas.microsoft.com/office/drawing/2010/main" xmlns="" w="9525" cap="flat">
                 <a:solidFill>
                   <a:srgbClr val="3465A4"/>
                 </a:solidFill>
@@ -7482,7 +7483,7 @@
               </a14:hiddenLine>
             </a:ext>
             <a:ext uri="{AF507438-7753-43e0-B8FC-AC1667EBCBE1}">
-              <a14:hiddenEffects xmlns:a14="http://schemas.microsoft.com/office/drawing/2010/main">
+              <a14:hiddenEffects xmlns:a14="http://schemas.microsoft.com/office/drawing/2010/main" xmlns="">
                 <a:effectLst>
                   <a:outerShdw blurRad="63500" dist="38099" dir="2700000" algn="ctr" rotWithShape="0">
                     <a:srgbClr val="000000">
@@ -7527,14 +7528,14 @@
           <a:effectLst/>
           <a:extLst>
             <a:ext uri="{909E8E84-426E-40dd-AFC4-6F175D3DCCD1}">
-              <a14:hiddenFill xmlns:a14="http://schemas.microsoft.com/office/drawing/2010/main">
+              <a14:hiddenFill xmlns:a14="http://schemas.microsoft.com/office/drawing/2010/main" xmlns="">
                 <a:solidFill>
                   <a:srgbClr val="FFFFFF"/>
                 </a:solidFill>
               </a14:hiddenFill>
             </a:ext>
             <a:ext uri="{91240B29-F687-4f45-9708-019B960494DF}">
-              <a14:hiddenLine xmlns:a14="http://schemas.microsoft.com/office/drawing/2010/main" w="9525" cap="flat">
+              <a14:hiddenLine xmlns:a14="http://schemas.microsoft.com/office/drawing/2010/main" xmlns="" w="9525" cap="flat">
                 <a:solidFill>
                   <a:srgbClr val="3465A4"/>
                 </a:solidFill>
@@ -7544,7 +7545,7 @@
               </a14:hiddenLine>
             </a:ext>
             <a:ext uri="{AF507438-7753-43e0-B8FC-AC1667EBCBE1}">
-              <a14:hiddenEffects xmlns:a14="http://schemas.microsoft.com/office/drawing/2010/main">
+              <a14:hiddenEffects xmlns:a14="http://schemas.microsoft.com/office/drawing/2010/main" xmlns="">
                 <a:effectLst>
                   <a:outerShdw blurRad="63500" dist="38099" dir="2700000" algn="ctr" rotWithShape="0">
                     <a:schemeClr val="bg2">
@@ -7555,7 +7556,7 @@
               </a14:hiddenEffects>
             </a:ext>
             <a:ext uri="{FAA26D3D-D897-4be2-8F04-BA451C77F1D7}">
-              <ma14:placeholderFlag xmlns:ma14="http://schemas.microsoft.com/office/mac/drawingml/2011/main" val="1"/>
+              <ma14:placeholderFlag xmlns:ma14="http://schemas.microsoft.com/office/mac/drawingml/2011/main" xmlns="" val="1"/>
             </a:ext>
           </a:extLst>
         </p:spPr>
@@ -7600,14 +7601,14 @@
           <a:effectLst/>
           <a:extLst>
             <a:ext uri="{909E8E84-426E-40dd-AFC4-6F175D3DCCD1}">
-              <a14:hiddenFill xmlns:a14="http://schemas.microsoft.com/office/drawing/2010/main">
+              <a14:hiddenFill xmlns:a14="http://schemas.microsoft.com/office/drawing/2010/main" xmlns="">
                 <a:solidFill>
                   <a:srgbClr val="FFFFFF"/>
                 </a:solidFill>
               </a14:hiddenFill>
             </a:ext>
             <a:ext uri="{91240B29-F687-4f45-9708-019B960494DF}">
-              <a14:hiddenLine xmlns:a14="http://schemas.microsoft.com/office/drawing/2010/main" w="9525" cap="flat">
+              <a14:hiddenLine xmlns:a14="http://schemas.microsoft.com/office/drawing/2010/main" xmlns="" w="9525" cap="flat">
                 <a:solidFill>
                   <a:srgbClr val="3465A4"/>
                 </a:solidFill>
@@ -7617,7 +7618,7 @@
               </a14:hiddenLine>
             </a:ext>
             <a:ext uri="{AF507438-7753-43e0-B8FC-AC1667EBCBE1}">
-              <a14:hiddenEffects xmlns:a14="http://schemas.microsoft.com/office/drawing/2010/main">
+              <a14:hiddenEffects xmlns:a14="http://schemas.microsoft.com/office/drawing/2010/main" xmlns="">
                 <a:effectLst>
                   <a:outerShdw blurRad="63500" dist="38099" dir="2700000" algn="ctr" rotWithShape="0">
                     <a:schemeClr val="bg2">
@@ -7628,7 +7629,7 @@
               </a14:hiddenEffects>
             </a:ext>
             <a:ext uri="{FAA26D3D-D897-4be2-8F04-BA451C77F1D7}">
-              <ma14:placeholderFlag xmlns:ma14="http://schemas.microsoft.com/office/mac/drawingml/2011/main" val="1"/>
+              <ma14:placeholderFlag xmlns:ma14="http://schemas.microsoft.com/office/mac/drawingml/2011/main" xmlns="" val="1"/>
             </a:ext>
           </a:extLst>
         </p:spPr>
@@ -7717,7 +7718,7 @@
           <a:effectLst/>
           <a:extLst>
             <a:ext uri="{91240B29-F687-4f45-9708-019B960494DF}">
-              <a14:hiddenLine xmlns:a14="http://schemas.microsoft.com/office/drawing/2010/main" w="9525" cap="flat">
+              <a14:hiddenLine xmlns:a14="http://schemas.microsoft.com/office/drawing/2010/main" xmlns="" w="9525" cap="flat">
                 <a:solidFill>
                   <a:srgbClr val="3465A4"/>
                 </a:solidFill>
@@ -7727,7 +7728,7 @@
               </a14:hiddenLine>
             </a:ext>
             <a:ext uri="{AF507438-7753-43e0-B8FC-AC1667EBCBE1}">
-              <a14:hiddenEffects xmlns:a14="http://schemas.microsoft.com/office/drawing/2010/main">
+              <a14:hiddenEffects xmlns:a14="http://schemas.microsoft.com/office/drawing/2010/main" xmlns="">
                 <a:effectLst>
                   <a:outerShdw blurRad="63500" dist="38099" dir="2700000" algn="ctr" rotWithShape="0">
                     <a:srgbClr val="000000">
@@ -7772,14 +7773,14 @@
           <a:effectLst/>
           <a:extLst>
             <a:ext uri="{909E8E84-426E-40dd-AFC4-6F175D3DCCD1}">
-              <a14:hiddenFill xmlns:a14="http://schemas.microsoft.com/office/drawing/2010/main">
+              <a14:hiddenFill xmlns:a14="http://schemas.microsoft.com/office/drawing/2010/main" xmlns="">
                 <a:solidFill>
                   <a:srgbClr val="FFFFFF"/>
                 </a:solidFill>
               </a14:hiddenFill>
             </a:ext>
             <a:ext uri="{91240B29-F687-4f45-9708-019B960494DF}">
-              <a14:hiddenLine xmlns:a14="http://schemas.microsoft.com/office/drawing/2010/main" w="9525" cap="flat">
+              <a14:hiddenLine xmlns:a14="http://schemas.microsoft.com/office/drawing/2010/main" xmlns="" w="9525" cap="flat">
                 <a:solidFill>
                   <a:srgbClr val="3465A4"/>
                 </a:solidFill>
@@ -7789,7 +7790,7 @@
               </a14:hiddenLine>
             </a:ext>
             <a:ext uri="{AF507438-7753-43e0-B8FC-AC1667EBCBE1}">
-              <a14:hiddenEffects xmlns:a14="http://schemas.microsoft.com/office/drawing/2010/main">
+              <a14:hiddenEffects xmlns:a14="http://schemas.microsoft.com/office/drawing/2010/main" xmlns="">
                 <a:effectLst>
                   <a:outerShdw blurRad="63500" dist="38099" dir="2700000" algn="ctr" rotWithShape="0">
                     <a:schemeClr val="bg2">
@@ -7800,7 +7801,7 @@
               </a14:hiddenEffects>
             </a:ext>
             <a:ext uri="{FAA26D3D-D897-4be2-8F04-BA451C77F1D7}">
-              <ma14:placeholderFlag xmlns:ma14="http://schemas.microsoft.com/office/mac/drawingml/2011/main" val="1"/>
+              <ma14:placeholderFlag xmlns:ma14="http://schemas.microsoft.com/office/mac/drawingml/2011/main" xmlns="" val="1"/>
             </a:ext>
           </a:extLst>
         </p:spPr>
@@ -7849,7 +7850,7 @@
             <a:fld id="{F5DD8764-190F-504E-957F-C8447ED72940}" type="datetime1">
               <a:rPr lang="nl-NL"/>
               <a:pPr/>
-              <a:t>01/12/15</a:t>
+              <a:t>1-12-2015</a:t>
             </a:fld>
             <a:endParaRPr lang="nl-NL"/>
           </a:p>
@@ -7880,14 +7881,14 @@
           <a:effectLst/>
           <a:extLst>
             <a:ext uri="{909E8E84-426E-40dd-AFC4-6F175D3DCCD1}">
-              <a14:hiddenFill xmlns:a14="http://schemas.microsoft.com/office/drawing/2010/main">
+              <a14:hiddenFill xmlns:a14="http://schemas.microsoft.com/office/drawing/2010/main" xmlns="">
                 <a:solidFill>
                   <a:srgbClr val="FFFFFF"/>
                 </a:solidFill>
               </a14:hiddenFill>
             </a:ext>
             <a:ext uri="{91240B29-F687-4f45-9708-019B960494DF}">
-              <a14:hiddenLine xmlns:a14="http://schemas.microsoft.com/office/drawing/2010/main" w="9525" cap="flat">
+              <a14:hiddenLine xmlns:a14="http://schemas.microsoft.com/office/drawing/2010/main" xmlns="" w="9525" cap="flat">
                 <a:solidFill>
                   <a:srgbClr val="3465A4"/>
                 </a:solidFill>
@@ -7897,7 +7898,7 @@
               </a14:hiddenLine>
             </a:ext>
             <a:ext uri="{AF507438-7753-43e0-B8FC-AC1667EBCBE1}">
-              <a14:hiddenEffects xmlns:a14="http://schemas.microsoft.com/office/drawing/2010/main">
+              <a14:hiddenEffects xmlns:a14="http://schemas.microsoft.com/office/drawing/2010/main" xmlns="">
                 <a:effectLst>
                   <a:outerShdw blurRad="63500" dist="38099" dir="2700000" algn="ctr" rotWithShape="0">
                     <a:schemeClr val="bg2">
@@ -7908,7 +7909,7 @@
               </a14:hiddenEffects>
             </a:ext>
             <a:ext uri="{FAA26D3D-D897-4be2-8F04-BA451C77F1D7}">
-              <ma14:placeholderFlag xmlns:ma14="http://schemas.microsoft.com/office/mac/drawingml/2011/main" val="1"/>
+              <ma14:placeholderFlag xmlns:ma14="http://schemas.microsoft.com/office/mac/drawingml/2011/main" xmlns="" val="1"/>
             </a:ext>
           </a:extLst>
         </p:spPr>
@@ -8003,7 +8004,7 @@
           <a:effectLst/>
           <a:extLst>
             <a:ext uri="{909E8E84-426E-40dd-AFC4-6F175D3DCCD1}">
-              <a14:hiddenFill xmlns:a14="http://schemas.microsoft.com/office/drawing/2010/main">
+              <a14:hiddenFill xmlns:a14="http://schemas.microsoft.com/office/drawing/2010/main" xmlns="">
                 <a:blipFill dpi="0" rotWithShape="0">
                   <a:blip/>
                   <a:srcRect/>
@@ -8014,7 +8015,7 @@
               </a14:hiddenFill>
             </a:ext>
             <a:ext uri="{91240B29-F687-4f45-9708-019B960494DF}">
-              <a14:hiddenLine xmlns:a14="http://schemas.microsoft.com/office/drawing/2010/main" w="9525" cap="flat">
+              <a14:hiddenLine xmlns:a14="http://schemas.microsoft.com/office/drawing/2010/main" xmlns="" w="9525" cap="flat">
                 <a:solidFill>
                   <a:srgbClr val="3465A4"/>
                 </a:solidFill>
@@ -8024,7 +8025,7 @@
               </a14:hiddenLine>
             </a:ext>
             <a:ext uri="{AF507438-7753-43e0-B8FC-AC1667EBCBE1}">
-              <a14:hiddenEffects xmlns:a14="http://schemas.microsoft.com/office/drawing/2010/main">
+              <a14:hiddenEffects xmlns:a14="http://schemas.microsoft.com/office/drawing/2010/main" xmlns="">
                 <a:effectLst>
                   <a:outerShdw blurRad="63500" dist="38099" dir="2700000" algn="ctr" rotWithShape="0">
                     <a:srgbClr val="000000">
@@ -8587,7 +8588,7 @@
           <a:effectLst/>
           <a:extLst>
             <a:ext uri="{91240B29-F687-4f45-9708-019B960494DF}">
-              <a14:hiddenLine xmlns:a14="http://schemas.microsoft.com/office/drawing/2010/main" w="9525" cap="flat">
+              <a14:hiddenLine xmlns:a14="http://schemas.microsoft.com/office/drawing/2010/main" xmlns="" w="9525" cap="flat">
                 <a:solidFill>
                   <a:srgbClr val="3465A4"/>
                 </a:solidFill>
@@ -8597,7 +8598,7 @@
               </a14:hiddenLine>
             </a:ext>
             <a:ext uri="{AF507438-7753-43e0-B8FC-AC1667EBCBE1}">
-              <a14:hiddenEffects xmlns:a14="http://schemas.microsoft.com/office/drawing/2010/main">
+              <a14:hiddenEffects xmlns:a14="http://schemas.microsoft.com/office/drawing/2010/main" xmlns="">
                 <a:effectLst>
                   <a:outerShdw blurRad="63500" dist="38099" dir="2700000" algn="ctr" rotWithShape="0">
                     <a:srgbClr val="000000">
@@ -8644,7 +8645,7 @@
           <a:effectLst/>
           <a:extLst>
             <a:ext uri="{91240B29-F687-4f45-9708-019B960494DF}">
-              <a14:hiddenLine xmlns:a14="http://schemas.microsoft.com/office/drawing/2010/main" w="9525" cap="flat">
+              <a14:hiddenLine xmlns:a14="http://schemas.microsoft.com/office/drawing/2010/main" xmlns="" w="9525" cap="flat">
                 <a:solidFill>
                   <a:srgbClr val="3465A4"/>
                 </a:solidFill>
@@ -8654,7 +8655,7 @@
               </a14:hiddenLine>
             </a:ext>
             <a:ext uri="{AF507438-7753-43e0-B8FC-AC1667EBCBE1}">
-              <a14:hiddenEffects xmlns:a14="http://schemas.microsoft.com/office/drawing/2010/main">
+              <a14:hiddenEffects xmlns:a14="http://schemas.microsoft.com/office/drawing/2010/main" xmlns="">
                 <a:effectLst>
                   <a:outerShdw blurRad="63500" dist="38099" dir="2700000" algn="ctr" rotWithShape="0">
                     <a:srgbClr val="000000">
@@ -8701,7 +8702,7 @@
           <a:effectLst/>
           <a:extLst>
             <a:ext uri="{91240B29-F687-4f45-9708-019B960494DF}">
-              <a14:hiddenLine xmlns:a14="http://schemas.microsoft.com/office/drawing/2010/main" w="9525" cap="flat">
+              <a14:hiddenLine xmlns:a14="http://schemas.microsoft.com/office/drawing/2010/main" xmlns="" w="9525" cap="flat">
                 <a:solidFill>
                   <a:srgbClr val="3465A4"/>
                 </a:solidFill>
@@ -8711,7 +8712,7 @@
               </a14:hiddenLine>
             </a:ext>
             <a:ext uri="{AF507438-7753-43e0-B8FC-AC1667EBCBE1}">
-              <a14:hiddenEffects xmlns:a14="http://schemas.microsoft.com/office/drawing/2010/main">
+              <a14:hiddenEffects xmlns:a14="http://schemas.microsoft.com/office/drawing/2010/main" xmlns="">
                 <a:effectLst>
                   <a:outerShdw blurRad="63500" dist="38099" dir="2700000" algn="ctr" rotWithShape="0">
                     <a:srgbClr val="000000">
@@ -8767,7 +8768,7 @@
           <a:effectLst/>
           <a:extLst>
             <a:ext uri="{909E8E84-426E-40dd-AFC4-6F175D3DCCD1}">
-              <a14:hiddenFill xmlns:a14="http://schemas.microsoft.com/office/drawing/2010/main">
+              <a14:hiddenFill xmlns:a14="http://schemas.microsoft.com/office/drawing/2010/main" xmlns="">
                 <a:blipFill dpi="0" rotWithShape="0">
                   <a:blip/>
                   <a:srcRect/>
@@ -8778,7 +8779,7 @@
               </a14:hiddenFill>
             </a:ext>
             <a:ext uri="{91240B29-F687-4f45-9708-019B960494DF}">
-              <a14:hiddenLine xmlns:a14="http://schemas.microsoft.com/office/drawing/2010/main" w="9525" cap="flat">
+              <a14:hiddenLine xmlns:a14="http://schemas.microsoft.com/office/drawing/2010/main" xmlns="" w="9525" cap="flat">
                 <a:solidFill>
                   <a:srgbClr val="3465A4"/>
                 </a:solidFill>
@@ -8788,7 +8789,7 @@
               </a14:hiddenLine>
             </a:ext>
             <a:ext uri="{AF507438-7753-43e0-B8FC-AC1667EBCBE1}">
-              <a14:hiddenEffects xmlns:a14="http://schemas.microsoft.com/office/drawing/2010/main">
+              <a14:hiddenEffects xmlns:a14="http://schemas.microsoft.com/office/drawing/2010/main" xmlns="">
                 <a:effectLst>
                   <a:outerShdw blurRad="63500" dist="38099" dir="2700000" algn="ctr" rotWithShape="0">
                     <a:srgbClr val="000000">
@@ -8826,14 +8827,14 @@
           <a:effectLst/>
           <a:extLst>
             <a:ext uri="{909E8E84-426E-40dd-AFC4-6F175D3DCCD1}">
-              <a14:hiddenFill xmlns:a14="http://schemas.microsoft.com/office/drawing/2010/main">
+              <a14:hiddenFill xmlns:a14="http://schemas.microsoft.com/office/drawing/2010/main" xmlns="">
                 <a:solidFill>
                   <a:srgbClr val="FFFFFF"/>
                 </a:solidFill>
               </a14:hiddenFill>
             </a:ext>
             <a:ext uri="{91240B29-F687-4f45-9708-019B960494DF}">
-              <a14:hiddenLine xmlns:a14="http://schemas.microsoft.com/office/drawing/2010/main" w="9525" cap="flat">
+              <a14:hiddenLine xmlns:a14="http://schemas.microsoft.com/office/drawing/2010/main" xmlns="" w="9525" cap="flat">
                 <a:solidFill>
                   <a:srgbClr val="3465A4"/>
                 </a:solidFill>
@@ -8843,7 +8844,7 @@
               </a14:hiddenLine>
             </a:ext>
             <a:ext uri="{AF507438-7753-43e0-B8FC-AC1667EBCBE1}">
-              <a14:hiddenEffects xmlns:a14="http://schemas.microsoft.com/office/drawing/2010/main">
+              <a14:hiddenEffects xmlns:a14="http://schemas.microsoft.com/office/drawing/2010/main" xmlns="">
                 <a:effectLst>
                   <a:outerShdw blurRad="63500" dist="38099" dir="2700000" algn="ctr" rotWithShape="0">
                     <a:schemeClr val="bg2">
@@ -8854,7 +8855,7 @@
               </a14:hiddenEffects>
             </a:ext>
             <a:ext uri="{FAA26D3D-D897-4be2-8F04-BA451C77F1D7}">
-              <ma14:placeholderFlag xmlns:ma14="http://schemas.microsoft.com/office/mac/drawingml/2011/main" val="1"/>
+              <ma14:placeholderFlag xmlns:ma14="http://schemas.microsoft.com/office/mac/drawingml/2011/main" xmlns="" val="1"/>
             </a:ext>
           </a:extLst>
         </p:spPr>
@@ -8899,14 +8900,14 @@
           <a:effectLst/>
           <a:extLst>
             <a:ext uri="{909E8E84-426E-40dd-AFC4-6F175D3DCCD1}">
-              <a14:hiddenFill xmlns:a14="http://schemas.microsoft.com/office/drawing/2010/main">
+              <a14:hiddenFill xmlns:a14="http://schemas.microsoft.com/office/drawing/2010/main" xmlns="">
                 <a:solidFill>
                   <a:srgbClr val="FFFFFF"/>
                 </a:solidFill>
               </a14:hiddenFill>
             </a:ext>
             <a:ext uri="{91240B29-F687-4f45-9708-019B960494DF}">
-              <a14:hiddenLine xmlns:a14="http://schemas.microsoft.com/office/drawing/2010/main" w="9525" cap="flat">
+              <a14:hiddenLine xmlns:a14="http://schemas.microsoft.com/office/drawing/2010/main" xmlns="" w="9525" cap="flat">
                 <a:solidFill>
                   <a:srgbClr val="3465A4"/>
                 </a:solidFill>
@@ -8916,7 +8917,7 @@
               </a14:hiddenLine>
             </a:ext>
             <a:ext uri="{AF507438-7753-43e0-B8FC-AC1667EBCBE1}">
-              <a14:hiddenEffects xmlns:a14="http://schemas.microsoft.com/office/drawing/2010/main">
+              <a14:hiddenEffects xmlns:a14="http://schemas.microsoft.com/office/drawing/2010/main" xmlns="">
                 <a:effectLst>
                   <a:outerShdw blurRad="63500" dist="38099" dir="2700000" algn="ctr" rotWithShape="0">
                     <a:schemeClr val="bg2">
@@ -8927,7 +8928,7 @@
               </a14:hiddenEffects>
             </a:ext>
             <a:ext uri="{FAA26D3D-D897-4be2-8F04-BA451C77F1D7}">
-              <ma14:placeholderFlag xmlns:ma14="http://schemas.microsoft.com/office/mac/drawingml/2011/main" val="1"/>
+              <ma14:placeholderFlag xmlns:ma14="http://schemas.microsoft.com/office/mac/drawingml/2011/main" xmlns="" val="1"/>
             </a:ext>
           </a:extLst>
         </p:spPr>
@@ -9014,14 +9015,14 @@
           <a:effectLst/>
           <a:extLst>
             <a:ext uri="{909E8E84-426E-40dd-AFC4-6F175D3DCCD1}">
-              <a14:hiddenFill xmlns:a14="http://schemas.microsoft.com/office/drawing/2010/main">
+              <a14:hiddenFill xmlns:a14="http://schemas.microsoft.com/office/drawing/2010/main" xmlns="">
                 <a:solidFill>
                   <a:srgbClr val="FFFFFF"/>
                 </a:solidFill>
               </a14:hiddenFill>
             </a:ext>
             <a:ext uri="{91240B29-F687-4f45-9708-019B960494DF}">
-              <a14:hiddenLine xmlns:a14="http://schemas.microsoft.com/office/drawing/2010/main" w="9525" cap="flat">
+              <a14:hiddenLine xmlns:a14="http://schemas.microsoft.com/office/drawing/2010/main" xmlns="" w="9525" cap="flat">
                 <a:solidFill>
                   <a:srgbClr val="3465A4"/>
                 </a:solidFill>
@@ -9031,7 +9032,7 @@
               </a14:hiddenLine>
             </a:ext>
             <a:ext uri="{AF507438-7753-43e0-B8FC-AC1667EBCBE1}">
-              <a14:hiddenEffects xmlns:a14="http://schemas.microsoft.com/office/drawing/2010/main">
+              <a14:hiddenEffects xmlns:a14="http://schemas.microsoft.com/office/drawing/2010/main" xmlns="">
                 <a:effectLst>
                   <a:outerShdw blurRad="63500" dist="38099" dir="2700000" algn="ctr" rotWithShape="0">
                     <a:schemeClr val="bg2">
@@ -9042,7 +9043,7 @@
               </a14:hiddenEffects>
             </a:ext>
             <a:ext uri="{FAA26D3D-D897-4be2-8F04-BA451C77F1D7}">
-              <ma14:placeholderFlag xmlns:ma14="http://schemas.microsoft.com/office/mac/drawingml/2011/main" val="1"/>
+              <ma14:placeholderFlag xmlns:ma14="http://schemas.microsoft.com/office/mac/drawingml/2011/main" xmlns="" val="1"/>
             </a:ext>
           </a:extLst>
         </p:spPr>
@@ -9076,7 +9077,7 @@
             <a:fld id="{70DC9591-908D-E442-BCA0-75E7C4843B27}" type="datetime1">
               <a:rPr lang="en-US"/>
               <a:pPr/>
-              <a:t>01/12/15</a:t>
+              <a:t>12/1/2015</a:t>
             </a:fld>
             <a:endParaRPr lang="en-US"/>
           </a:p>
@@ -9107,14 +9108,14 @@
           <a:effectLst/>
           <a:extLst>
             <a:ext uri="{909E8E84-426E-40dd-AFC4-6F175D3DCCD1}">
-              <a14:hiddenFill xmlns:a14="http://schemas.microsoft.com/office/drawing/2010/main">
+              <a14:hiddenFill xmlns:a14="http://schemas.microsoft.com/office/drawing/2010/main" xmlns="">
                 <a:solidFill>
                   <a:srgbClr val="FFFFFF"/>
                 </a:solidFill>
               </a14:hiddenFill>
             </a:ext>
             <a:ext uri="{91240B29-F687-4f45-9708-019B960494DF}">
-              <a14:hiddenLine xmlns:a14="http://schemas.microsoft.com/office/drawing/2010/main" w="9525" cap="flat">
+              <a14:hiddenLine xmlns:a14="http://schemas.microsoft.com/office/drawing/2010/main" xmlns="" w="9525" cap="flat">
                 <a:solidFill>
                   <a:srgbClr val="3465A4"/>
                 </a:solidFill>
@@ -9124,7 +9125,7 @@
               </a14:hiddenLine>
             </a:ext>
             <a:ext uri="{AF507438-7753-43e0-B8FC-AC1667EBCBE1}">
-              <a14:hiddenEffects xmlns:a14="http://schemas.microsoft.com/office/drawing/2010/main">
+              <a14:hiddenEffects xmlns:a14="http://schemas.microsoft.com/office/drawing/2010/main" xmlns="">
                 <a:effectLst>
                   <a:outerShdw blurRad="63500" dist="38099" dir="2700000" algn="ctr" rotWithShape="0">
                     <a:schemeClr val="bg2">
@@ -9135,7 +9136,7 @@
               </a14:hiddenEffects>
             </a:ext>
             <a:ext uri="{FAA26D3D-D897-4be2-8F04-BA451C77F1D7}">
-              <ma14:placeholderFlag xmlns:ma14="http://schemas.microsoft.com/office/mac/drawingml/2011/main" val="1"/>
+              <ma14:placeholderFlag xmlns:ma14="http://schemas.microsoft.com/office/mac/drawingml/2011/main" xmlns="" val="1"/>
             </a:ext>
           </a:extLst>
         </p:spPr>
@@ -9716,14 +9717,14 @@
           <a:effectLst/>
           <a:extLst>
             <a:ext uri="{909E8E84-426E-40dd-AFC4-6F175D3DCCD1}">
-              <a14:hiddenFill xmlns:a14="http://schemas.microsoft.com/office/drawing/2010/main">
+              <a14:hiddenFill xmlns:a14="http://schemas.microsoft.com/office/drawing/2010/main" xmlns="">
                 <a:solidFill>
                   <a:srgbClr val="FFFFFF"/>
                 </a:solidFill>
               </a14:hiddenFill>
             </a:ext>
             <a:ext uri="{91240B29-F687-4f45-9708-019B960494DF}">
-              <a14:hiddenLine xmlns:a14="http://schemas.microsoft.com/office/drawing/2010/main" w="9525" cap="flat">
+              <a14:hiddenLine xmlns:a14="http://schemas.microsoft.com/office/drawing/2010/main" xmlns="" w="9525" cap="flat">
                 <a:solidFill>
                   <a:srgbClr val="3465A4"/>
                 </a:solidFill>
@@ -9733,7 +9734,7 @@
               </a14:hiddenLine>
             </a:ext>
             <a:ext uri="{AF507438-7753-43e0-B8FC-AC1667EBCBE1}">
-              <a14:hiddenEffects xmlns:a14="http://schemas.microsoft.com/office/drawing/2010/main">
+              <a14:hiddenEffects xmlns:a14="http://schemas.microsoft.com/office/drawing/2010/main" xmlns="">
                 <a:effectLst>
                   <a:outerShdw blurRad="63500" dist="38099" dir="2700000" algn="ctr" rotWithShape="0">
                     <a:srgbClr val="000000">
@@ -10103,14 +10104,14 @@
           <a:effectLst/>
           <a:extLst>
             <a:ext uri="{909E8E84-426E-40dd-AFC4-6F175D3DCCD1}">
-              <a14:hiddenFill xmlns:a14="http://schemas.microsoft.com/office/drawing/2010/main">
+              <a14:hiddenFill xmlns:a14="http://schemas.microsoft.com/office/drawing/2010/main" xmlns="">
                 <a:solidFill>
                   <a:srgbClr val="FFFFFF"/>
                 </a:solidFill>
               </a14:hiddenFill>
             </a:ext>
             <a:ext uri="{91240B29-F687-4f45-9708-019B960494DF}">
-              <a14:hiddenLine xmlns:a14="http://schemas.microsoft.com/office/drawing/2010/main" w="9525" cap="flat">
+              <a14:hiddenLine xmlns:a14="http://schemas.microsoft.com/office/drawing/2010/main" xmlns="" w="9525" cap="flat">
                 <a:solidFill>
                   <a:srgbClr val="3465A4"/>
                 </a:solidFill>
@@ -10120,7 +10121,7 @@
               </a14:hiddenLine>
             </a:ext>
             <a:ext uri="{AF507438-7753-43e0-B8FC-AC1667EBCBE1}">
-              <a14:hiddenEffects xmlns:a14="http://schemas.microsoft.com/office/drawing/2010/main">
+              <a14:hiddenEffects xmlns:a14="http://schemas.microsoft.com/office/drawing/2010/main" xmlns="">
                 <a:effectLst>
                   <a:outerShdw blurRad="63500" dist="38099" dir="2700000" algn="ctr" rotWithShape="0">
                     <a:srgbClr val="000000">
@@ -10566,14 +10567,14 @@
           <a:effectLst/>
           <a:extLst>
             <a:ext uri="{909E8E84-426E-40dd-AFC4-6F175D3DCCD1}">
-              <a14:hiddenFill xmlns:a14="http://schemas.microsoft.com/office/drawing/2010/main">
+              <a14:hiddenFill xmlns:a14="http://schemas.microsoft.com/office/drawing/2010/main" xmlns="">
                 <a:solidFill>
                   <a:srgbClr val="FFFFFF"/>
                 </a:solidFill>
               </a14:hiddenFill>
             </a:ext>
             <a:ext uri="{91240B29-F687-4f45-9708-019B960494DF}">
-              <a14:hiddenLine xmlns:a14="http://schemas.microsoft.com/office/drawing/2010/main" w="9525" cap="flat">
+              <a14:hiddenLine xmlns:a14="http://schemas.microsoft.com/office/drawing/2010/main" xmlns="" w="9525" cap="flat">
                 <a:solidFill>
                   <a:srgbClr val="3465A4"/>
                 </a:solidFill>
@@ -10583,7 +10584,7 @@
               </a14:hiddenLine>
             </a:ext>
             <a:ext uri="{AF507438-7753-43e0-B8FC-AC1667EBCBE1}">
-              <a14:hiddenEffects xmlns:a14="http://schemas.microsoft.com/office/drawing/2010/main">
+              <a14:hiddenEffects xmlns:a14="http://schemas.microsoft.com/office/drawing/2010/main" xmlns="">
                 <a:effectLst>
                   <a:outerShdw blurRad="63500" dist="38099" dir="2700000" algn="ctr" rotWithShape="0">
                     <a:srgbClr val="000000">
@@ -10996,7 +10997,7 @@
           <a:effectLst/>
           <a:extLst>
             <a:ext uri="{909E8E84-426E-40dd-AFC4-6F175D3DCCD1}">
-              <a14:hiddenFill xmlns:a14="http://schemas.microsoft.com/office/drawing/2010/main">
+              <a14:hiddenFill xmlns:a14="http://schemas.microsoft.com/office/drawing/2010/main" xmlns="">
                 <a:blipFill dpi="0" rotWithShape="0">
                   <a:blip/>
                   <a:srcRect/>
@@ -11007,7 +11008,7 @@
               </a14:hiddenFill>
             </a:ext>
             <a:ext uri="{91240B29-F687-4f45-9708-019B960494DF}">
-              <a14:hiddenLine xmlns:a14="http://schemas.microsoft.com/office/drawing/2010/main" w="9525" cap="flat">
+              <a14:hiddenLine xmlns:a14="http://schemas.microsoft.com/office/drawing/2010/main" xmlns="" w="9525" cap="flat">
                 <a:solidFill>
                   <a:srgbClr val="3465A4"/>
                 </a:solidFill>
@@ -11017,7 +11018,7 @@
               </a14:hiddenLine>
             </a:ext>
             <a:ext uri="{AF507438-7753-43e0-B8FC-AC1667EBCBE1}">
-              <a14:hiddenEffects xmlns:a14="http://schemas.microsoft.com/office/drawing/2010/main">
+              <a14:hiddenEffects xmlns:a14="http://schemas.microsoft.com/office/drawing/2010/main" xmlns="">
                 <a:effectLst>
                   <a:outerShdw blurRad="63500" dist="38099" dir="2700000" algn="ctr" rotWithShape="0">
                     <a:srgbClr val="000000">
@@ -11035,11 +11036,11 @@
   <p:clrMapOvr>
     <a:masterClrMapping/>
   </p:clrMapOvr>
-  <p:transition xmlns:p14="http://schemas.microsoft.com/office/powerpoint/2010/main" spd="med"/>
+  <p:transition spd="med"/>
   <p:timing>
     <p:tnLst>
       <p:par>
-        <p:cTn xmlns:p14="http://schemas.microsoft.com/office/powerpoint/2010/main" id="1" dur="indefinite" restart="never" nodeType="tmRoot">
+        <p:cTn id="1" dur="indefinite" restart="never" nodeType="tmRoot">
           <p:childTnLst>
             <p:seq concurrent="1" nextAc="seek">
               <p:cTn id="2" dur="0" nodeType="mainSeq"/>
@@ -11165,7 +11166,7 @@
           <a:effectLst/>
           <a:extLst>
             <a:ext uri="{AF507438-7753-43e0-B8FC-AC1667EBCBE1}">
-              <a14:hiddenEffects xmlns:a14="http://schemas.microsoft.com/office/drawing/2010/main">
+              <a14:hiddenEffects xmlns:a14="http://schemas.microsoft.com/office/drawing/2010/main" xmlns="">
                 <a:effectLst>
                   <a:outerShdw blurRad="63500" dist="38099" dir="2700000" algn="ctr" rotWithShape="0">
                     <a:schemeClr val="bg2">
@@ -11231,7 +11232,7 @@
   <p:timing>
     <p:tnLst>
       <p:par>
-        <p:cTn xmlns:p14="http://schemas.microsoft.com/office/powerpoint/2010/main" id="1" dur="indefinite" restart="never" nodeType="tmRoot"/>
+        <p:cTn id="1" dur="indefinite" restart="never" nodeType="tmRoot"/>
       </p:par>
     </p:tnLst>
   </p:timing>
@@ -11337,7 +11338,7 @@
           <a:effectLst/>
           <a:extLst>
             <a:ext uri="{AF507438-7753-43e0-B8FC-AC1667EBCBE1}">
-              <a14:hiddenEffects xmlns:a14="http://schemas.microsoft.com/office/drawing/2010/main">
+              <a14:hiddenEffects xmlns:a14="http://schemas.microsoft.com/office/drawing/2010/main" xmlns="">
                 <a:effectLst>
                   <a:outerShdw blurRad="63500" dist="38099" dir="2700000" algn="ctr" rotWithShape="0">
                     <a:schemeClr val="bg2">
@@ -11403,7 +11404,7 @@
   <p:timing>
     <p:tnLst>
       <p:par>
-        <p:cTn xmlns:p14="http://schemas.microsoft.com/office/powerpoint/2010/main" id="1" dur="indefinite" restart="never" nodeType="tmRoot"/>
+        <p:cTn id="1" dur="indefinite" restart="never" nodeType="tmRoot"/>
       </p:par>
     </p:tnLst>
   </p:timing>
@@ -11493,7 +11494,7 @@
   <p:timing>
     <p:tnLst>
       <p:par>
-        <p:cTn xmlns:p14="http://schemas.microsoft.com/office/powerpoint/2010/main" id="1" dur="indefinite" restart="never" nodeType="tmRoot"/>
+        <p:cTn id="1" dur="indefinite" restart="never" nodeType="tmRoot"/>
       </p:par>
     </p:tnLst>
   </p:timing>
@@ -11599,7 +11600,7 @@
           <a:effectLst/>
           <a:extLst>
             <a:ext uri="{AF507438-7753-43e0-B8FC-AC1667EBCBE1}">
-              <a14:hiddenEffects xmlns:a14="http://schemas.microsoft.com/office/drawing/2010/main">
+              <a14:hiddenEffects xmlns:a14="http://schemas.microsoft.com/office/drawing/2010/main" xmlns="">
                 <a:effectLst>
                   <a:outerShdw blurRad="63500" dist="38099" dir="2700000" algn="ctr" rotWithShape="0">
                     <a:schemeClr val="bg2">
@@ -11665,7 +11666,7 @@
   <p:timing>
     <p:tnLst>
       <p:par>
-        <p:cTn xmlns:p14="http://schemas.microsoft.com/office/powerpoint/2010/main" id="1" dur="indefinite" restart="never" nodeType="tmRoot"/>
+        <p:cTn id="1" dur="indefinite" restart="never" nodeType="tmRoot"/>
       </p:par>
     </p:tnLst>
   </p:timing>
@@ -11811,7 +11812,7 @@
   <p:timing>
     <p:tnLst>
       <p:par>
-        <p:cTn xmlns:p14="http://schemas.microsoft.com/office/powerpoint/2010/main" id="1" dur="indefinite" restart="never" nodeType="tmRoot"/>
+        <p:cTn id="1" dur="indefinite" restart="never" nodeType="tmRoot"/>
       </p:par>
     </p:tnLst>
   </p:timing>
@@ -11901,7 +11902,7 @@
   <p:timing>
     <p:tnLst>
       <p:par>
-        <p:cTn xmlns:p14="http://schemas.microsoft.com/office/powerpoint/2010/main" id="1" dur="indefinite" restart="never" nodeType="tmRoot"/>
+        <p:cTn id="1" dur="indefinite" restart="never" nodeType="tmRoot"/>
       </p:par>
     </p:tnLst>
   </p:timing>
@@ -12030,10 +12031,113 @@
   <p:timing>
     <p:tnLst>
       <p:par>
-        <p:cTn xmlns:p14="http://schemas.microsoft.com/office/powerpoint/2010/main" id="1" dur="indefinite" restart="never" nodeType="tmRoot"/>
+        <p:cTn id="1" dur="indefinite" restart="never" nodeType="tmRoot"/>
       </p:par>
     </p:tnLst>
   </p:timing>
+</p:sld>
+</file>
+
+<file path=ppt/slides/slide17.xml><?xml version="1.0" encoding="utf-8"?>
+<p:sld xmlns:a="http://schemas.openxmlformats.org/drawingml/2006/main" xmlns:r="http://schemas.openxmlformats.org/officeDocument/2006/relationships" xmlns:p="http://schemas.openxmlformats.org/presentationml/2006/main" showMasterSp="0">
+  <p:cSld>
+    <p:spTree>
+      <p:nvGrpSpPr>
+        <p:cNvPr id="1" name=""/>
+        <p:cNvGrpSpPr/>
+        <p:nvPr/>
+      </p:nvGrpSpPr>
+      <p:grpSpPr>
+        <a:xfrm>
+          <a:off x="0" y="0"/>
+          <a:ext cx="0" cy="0"/>
+          <a:chOff x="0" y="0"/>
+          <a:chExt cx="0" cy="0"/>
+        </a:xfrm>
+      </p:grpSpPr>
+      <p:pic>
+        <p:nvPicPr>
+          <p:cNvPr id="4" name="Picture 3"/>
+          <p:cNvPicPr>
+            <a:picLocks noChangeAspect="1"/>
+          </p:cNvPicPr>
+          <p:nvPr/>
+        </p:nvPicPr>
+        <p:blipFill>
+          <a:blip r:embed="rId2">
+            <a:extLst>
+              <a:ext uri="{28A0092B-C50C-407E-A947-70E740481C1C}">
+                <a14:useLocalDpi xmlns:a14="http://schemas.microsoft.com/office/drawing/2010/main" val="0"/>
+              </a:ext>
+            </a:extLst>
+          </a:blip>
+          <a:stretch>
+            <a:fillRect/>
+          </a:stretch>
+        </p:blipFill>
+        <p:spPr>
+          <a:xfrm>
+            <a:off x="1475656" y="764704"/>
+            <a:ext cx="6120680" cy="5874551"/>
+          </a:xfrm>
+          <a:prstGeom prst="rect">
+            <a:avLst/>
+          </a:prstGeom>
+        </p:spPr>
+      </p:pic>
+      <p:sp>
+        <p:nvSpPr>
+          <p:cNvPr id="5" name="TextBox 4"/>
+          <p:cNvSpPr txBox="1"/>
+          <p:nvPr/>
+        </p:nvSpPr>
+        <p:spPr>
+          <a:xfrm>
+            <a:off x="3675023" y="278751"/>
+            <a:ext cx="1721946" cy="477054"/>
+          </a:xfrm>
+          <a:prstGeom prst="rect">
+            <a:avLst/>
+          </a:prstGeom>
+          <a:noFill/>
+          <a:ln>
+            <a:solidFill>
+              <a:schemeClr val="tx1"/>
+            </a:solidFill>
+          </a:ln>
+        </p:spPr>
+        <p:txBody>
+          <a:bodyPr wrap="none" rtlCol="0">
+            <a:spAutoFit/>
+          </a:bodyPr>
+          <a:lstStyle/>
+          <a:p>
+            <a:r>
+              <a:rPr lang="en-US" dirty="0" smtClean="0">
+                <a:solidFill>
+                  <a:schemeClr val="tx1"/>
+                </a:solidFill>
+              </a:rPr>
+              <a:t>Front page</a:t>
+            </a:r>
+            <a:endParaRPr lang="en-US" dirty="0">
+              <a:solidFill>
+                <a:schemeClr val="tx1"/>
+              </a:solidFill>
+            </a:endParaRPr>
+          </a:p>
+        </p:txBody>
+      </p:sp>
+    </p:spTree>
+    <p:extLst>
+      <p:ext uri="{BB962C8B-B14F-4D97-AF65-F5344CB8AC3E}">
+        <p14:creationId xmlns:p14="http://schemas.microsoft.com/office/powerpoint/2010/main" val="3809299314"/>
+      </p:ext>
+    </p:extLst>
+  </p:cSld>
+  <p:clrMapOvr>
+    <a:masterClrMapping/>
+  </p:clrMapOvr>
 </p:sld>
 </file>
 
@@ -12077,14 +12181,14 @@
           <a:effectLst/>
           <a:extLst>
             <a:ext uri="{909E8E84-426E-40dd-AFC4-6F175D3DCCD1}">
-              <a14:hiddenFill xmlns:a14="http://schemas.microsoft.com/office/drawing/2010/main">
+              <a14:hiddenFill xmlns:a14="http://schemas.microsoft.com/office/drawing/2010/main" xmlns="">
                 <a:solidFill>
                   <a:srgbClr val="FFFFFF"/>
                 </a:solidFill>
               </a14:hiddenFill>
             </a:ext>
             <a:ext uri="{91240B29-F687-4f45-9708-019B960494DF}">
-              <a14:hiddenLine xmlns:a14="http://schemas.microsoft.com/office/drawing/2010/main" w="9525" cap="flat">
+              <a14:hiddenLine xmlns:a14="http://schemas.microsoft.com/office/drawing/2010/main" xmlns="" w="9525" cap="flat">
                 <a:solidFill>
                   <a:srgbClr val="3465A4"/>
                 </a:solidFill>
@@ -12094,7 +12198,7 @@
               </a14:hiddenLine>
             </a:ext>
             <a:ext uri="{AF507438-7753-43e0-B8FC-AC1667EBCBE1}">
-              <a14:hiddenEffects xmlns:a14="http://schemas.microsoft.com/office/drawing/2010/main">
+              <a14:hiddenEffects xmlns:a14="http://schemas.microsoft.com/office/drawing/2010/main" xmlns="">
                 <a:effectLst>
                   <a:outerShdw blurRad="63500" dist="38099" dir="2700000" algn="ctr" rotWithShape="0">
                     <a:srgbClr val="000000">
@@ -12487,14 +12591,14 @@
           <a:effectLst/>
           <a:extLst>
             <a:ext uri="{909E8E84-426E-40dd-AFC4-6F175D3DCCD1}">
-              <a14:hiddenFill xmlns:a14="http://schemas.microsoft.com/office/drawing/2010/main">
+              <a14:hiddenFill xmlns:a14="http://schemas.microsoft.com/office/drawing/2010/main" xmlns="">
                 <a:solidFill>
                   <a:srgbClr val="FFFFFF"/>
                 </a:solidFill>
               </a14:hiddenFill>
             </a:ext>
             <a:ext uri="{91240B29-F687-4f45-9708-019B960494DF}">
-              <a14:hiddenLine xmlns:a14="http://schemas.microsoft.com/office/drawing/2010/main" w="9525" cap="flat">
+              <a14:hiddenLine xmlns:a14="http://schemas.microsoft.com/office/drawing/2010/main" xmlns="" w="9525" cap="flat">
                 <a:solidFill>
                   <a:srgbClr val="3465A4"/>
                 </a:solidFill>
@@ -12504,7 +12608,7 @@
               </a14:hiddenLine>
             </a:ext>
             <a:ext uri="{AF507438-7753-43e0-B8FC-AC1667EBCBE1}">
-              <a14:hiddenEffects xmlns:a14="http://schemas.microsoft.com/office/drawing/2010/main">
+              <a14:hiddenEffects xmlns:a14="http://schemas.microsoft.com/office/drawing/2010/main" xmlns="">
                 <a:effectLst>
                   <a:outerShdw blurRad="63500" dist="38099" dir="2700000" algn="ctr" rotWithShape="0">
                     <a:srgbClr val="000000">
@@ -12900,14 +13004,14 @@
           <a:effectLst/>
           <a:extLst>
             <a:ext uri="{909E8E84-426E-40dd-AFC4-6F175D3DCCD1}">
-              <a14:hiddenFill xmlns:a14="http://schemas.microsoft.com/office/drawing/2010/main">
+              <a14:hiddenFill xmlns:a14="http://schemas.microsoft.com/office/drawing/2010/main" xmlns="">
                 <a:solidFill>
                   <a:srgbClr val="FFFFFF"/>
                 </a:solidFill>
               </a14:hiddenFill>
             </a:ext>
             <a:ext uri="{91240B29-F687-4f45-9708-019B960494DF}">
-              <a14:hiddenLine xmlns:a14="http://schemas.microsoft.com/office/drawing/2010/main" w="9525" cap="flat">
+              <a14:hiddenLine xmlns:a14="http://schemas.microsoft.com/office/drawing/2010/main" xmlns="" w="9525" cap="flat">
                 <a:solidFill>
                   <a:srgbClr val="3465A4"/>
                 </a:solidFill>
@@ -12917,7 +13021,7 @@
               </a14:hiddenLine>
             </a:ext>
             <a:ext uri="{AF507438-7753-43e0-B8FC-AC1667EBCBE1}">
-              <a14:hiddenEffects xmlns:a14="http://schemas.microsoft.com/office/drawing/2010/main">
+              <a14:hiddenEffects xmlns:a14="http://schemas.microsoft.com/office/drawing/2010/main" xmlns="">
                 <a:effectLst>
                   <a:outerShdw blurRad="63500" dist="38099" dir="2700000" algn="ctr" rotWithShape="0">
                     <a:srgbClr val="000000">
@@ -13366,11 +13470,11 @@
   <p:clrMapOvr>
     <a:masterClrMapping/>
   </p:clrMapOvr>
-  <p:transition xmlns:p14="http://schemas.microsoft.com/office/powerpoint/2010/main" spd="med"/>
+  <p:transition spd="med"/>
   <p:timing>
     <p:tnLst>
       <p:par>
-        <p:cTn xmlns:p14="http://schemas.microsoft.com/office/powerpoint/2010/main" id="1" dur="indefinite" restart="never" nodeType="tmRoot">
+        <p:cTn id="1" dur="indefinite" restart="never" nodeType="tmRoot">
           <p:childTnLst>
             <p:seq concurrent="1" nextAc="seek">
               <p:cTn id="2" dur="0" nodeType="mainSeq"/>
@@ -13682,7 +13786,7 @@
   <p:timing>
     <p:tnLst>
       <p:par>
-        <p:cTn xmlns:p14="http://schemas.microsoft.com/office/powerpoint/2010/main" id="1" dur="indefinite" restart="never" nodeType="tmRoot"/>
+        <p:cTn id="1" dur="indefinite" restart="never" nodeType="tmRoot"/>
       </p:par>
     </p:tnLst>
   </p:timing>
@@ -13874,7 +13978,7 @@
   <p:timing>
     <p:tnLst>
       <p:par>
-        <p:cTn xmlns:p14="http://schemas.microsoft.com/office/powerpoint/2010/main" id="1" dur="indefinite" restart="never" nodeType="tmRoot"/>
+        <p:cTn id="1" dur="indefinite" restart="never" nodeType="tmRoot"/>
       </p:par>
     </p:tnLst>
   </p:timing>
@@ -13969,7 +14073,7 @@
   <p:timing>
     <p:tnLst>
       <p:par>
-        <p:cTn xmlns:p14="http://schemas.microsoft.com/office/powerpoint/2010/main" id="1" dur="indefinite" restart="never" nodeType="tmRoot"/>
+        <p:cTn id="1" dur="indefinite" restart="never" nodeType="tmRoot"/>
       </p:par>
     </p:tnLst>
   </p:timing>
@@ -14227,7 +14331,7 @@
   <p:timing>
     <p:tnLst>
       <p:par>
-        <p:cTn xmlns:p14="http://schemas.microsoft.com/office/powerpoint/2010/main" id="1" dur="indefinite" restart="never" nodeType="tmRoot"/>
+        <p:cTn id="1" dur="indefinite" restart="never" nodeType="tmRoot"/>
       </p:par>
     </p:tnLst>
   </p:timing>
@@ -14409,7 +14513,7 @@
   <p:timing>
     <p:tnLst>
       <p:par>
-        <p:cTn xmlns:p14="http://schemas.microsoft.com/office/powerpoint/2010/main" id="1" dur="indefinite" restart="never" nodeType="tmRoot"/>
+        <p:cTn id="1" dur="indefinite" restart="never" nodeType="tmRoot"/>
       </p:par>
     </p:tnLst>
   </p:timing>
@@ -14504,7 +14608,7 @@
   <p:timing>
     <p:tnLst>
       <p:par>
-        <p:cTn xmlns:p14="http://schemas.microsoft.com/office/powerpoint/2010/main" id="1" dur="indefinite" restart="never" nodeType="tmRoot"/>
+        <p:cTn id="1" dur="indefinite" restart="never" nodeType="tmRoot"/>
       </p:par>
     </p:tnLst>
   </p:timing>
@@ -14806,7 +14910,7 @@
   <p:timing>
     <p:tnLst>
       <p:par>
-        <p:cTn xmlns:p14="http://schemas.microsoft.com/office/powerpoint/2010/main" id="1" dur="indefinite" restart="never" nodeType="tmRoot"/>
+        <p:cTn id="1" dur="indefinite" restart="never" nodeType="tmRoot"/>
       </p:par>
     </p:tnLst>
   </p:timing>
@@ -15059,7 +15163,7 @@
         <a:effectLst/>
         <a:extLst>
           <a:ext uri="{AF507438-7753-43e0-B8FC-AC1667EBCBE1}">
-            <a14:hiddenEffects xmlns:a14="http://schemas.microsoft.com/office/drawing/2010/main">
+            <a14:hiddenEffects xmlns:a14="http://schemas.microsoft.com/office/drawing/2010/main" xmlns="">
               <a:effectLst>
                 <a:outerShdw blurRad="63500" dist="38099" dir="2700000" algn="ctr" rotWithShape="0">
                   <a:schemeClr val="bg2">
@@ -15138,7 +15242,7 @@
         <a:effectLst/>
         <a:extLst>
           <a:ext uri="{AF507438-7753-43e0-B8FC-AC1667EBCBE1}">
-            <a14:hiddenEffects xmlns:a14="http://schemas.microsoft.com/office/drawing/2010/main">
+            <a14:hiddenEffects xmlns:a14="http://schemas.microsoft.com/office/drawing/2010/main" xmlns="">
               <a:effectLst>
                 <a:outerShdw blurRad="63500" dist="38099" dir="2700000" algn="ctr" rotWithShape="0">
                   <a:schemeClr val="bg2">
@@ -15727,7 +15831,7 @@
         <a:effectLst/>
         <a:extLst>
           <a:ext uri="{AF507438-7753-43e0-B8FC-AC1667EBCBE1}">
-            <a14:hiddenEffects xmlns:a14="http://schemas.microsoft.com/office/drawing/2010/main">
+            <a14:hiddenEffects xmlns:a14="http://schemas.microsoft.com/office/drawing/2010/main" xmlns="">
               <a:effectLst>
                 <a:outerShdw blurRad="63500" dist="38099" dir="2700000" algn="ctr" rotWithShape="0">
                   <a:schemeClr val="bg2">
@@ -15806,7 +15910,7 @@
         <a:effectLst/>
         <a:extLst>
           <a:ext uri="{AF507438-7753-43e0-B8FC-AC1667EBCBE1}">
-            <a14:hiddenEffects xmlns:a14="http://schemas.microsoft.com/office/drawing/2010/main">
+            <a14:hiddenEffects xmlns:a14="http://schemas.microsoft.com/office/drawing/2010/main" xmlns="">
               <a:effectLst>
                 <a:outerShdw blurRad="63500" dist="38099" dir="2700000" algn="ctr" rotWithShape="0">
                   <a:schemeClr val="bg2">

</xml_diff>